<commit_message>
init unity proj | vehicle movement init
</commit_message>
<xml_diff>
--- a/documents/Litrature Review.pptx
+++ b/documents/Litrature Review.pptx
@@ -9,8 +9,8 @@
   </p:notesMasterIdLst>
   <p:sldIdLst>
     <p:sldId id="256" r:id="rId2"/>
-    <p:sldId id="277" r:id="rId3"/>
-    <p:sldId id="257" r:id="rId4"/>
+    <p:sldId id="257" r:id="rId3"/>
+    <p:sldId id="277" r:id="rId4"/>
     <p:sldId id="276" r:id="rId5"/>
     <p:sldId id="267" r:id="rId6"/>
     <p:sldId id="269" r:id="rId7"/>
@@ -265,7 +265,7 @@
       <p15:sldGuideLst xmlns:p15="http://schemas.microsoft.com/office/powerpoint/2012/main"/>
     </p:ext>
     <p:ext uri="http://customooxmlschemas.google.com/">
-      <go:slidesCustomData xmlns:go="http://customooxmlschemas.google.com/" xmlns:p15="http://schemas.microsoft.com/office/powerpoint/2012/main" xmlns:p14="http://schemas.microsoft.com/office/powerpoint/2010/main" xmlns:com="http://schemas.openxmlformats.org/drawingml/2006/compatibility" xmlns:pvml="urn:schemas-microsoft-com:office:powerpoint" xmlns:v="urn:schemas-microsoft-com:vml" xmlns:o="urn:schemas-microsoft-com:office:office" xmlns:dgm="http://schemas.openxmlformats.org/drawingml/2006/diagram" xmlns:c="http://schemas.openxmlformats.org/drawingml/2006/chart" xmlns:mv="urn:schemas-microsoft-com:mac:vml" xmlns:mc="http://schemas.openxmlformats.org/markup-compatibility/2006" xmlns="" r:id="rId24" roundtripDataSignature="AMtx7mjtQ1srNo008AFggN65lsm/0suc6w=="/>
+      <go:slidesCustomData xmlns="" xmlns:mc="http://schemas.openxmlformats.org/markup-compatibility/2006" xmlns:mv="urn:schemas-microsoft-com:mac:vml" xmlns:c="http://schemas.openxmlformats.org/drawingml/2006/chart" xmlns:dgm="http://schemas.openxmlformats.org/drawingml/2006/diagram" xmlns:o="urn:schemas-microsoft-com:office:office" xmlns:v="urn:schemas-microsoft-com:vml" xmlns:pvml="urn:schemas-microsoft-com:office:powerpoint" xmlns:com="http://schemas.openxmlformats.org/drawingml/2006/compatibility" xmlns:p14="http://schemas.microsoft.com/office/powerpoint/2010/main" xmlns:p15="http://schemas.microsoft.com/office/powerpoint/2012/main" xmlns:go="http://customooxmlschemas.google.com/" r:id="rId24" roundtripDataSignature="AMtx7mjtQ1srNo008AFggN65lsm/0suc6w=="/>
     </p:ext>
   </p:extLst>
 </p:presentation>
@@ -18422,14 +18422,14 @@
           <p:nvPr>
             <p:extLst>
               <p:ext uri="{D42A27DB-BD31-4B8C-83A1-F6EECF244321}">
-                <p14:modId xmlns:p14="http://schemas.microsoft.com/office/powerpoint/2010/main" val="1186651131"/>
+                <p14:modId xmlns:p14="http://schemas.microsoft.com/office/powerpoint/2010/main" val="2524621982"/>
               </p:ext>
             </p:extLst>
           </p:nvPr>
         </p:nvGraphicFramePr>
         <p:xfrm>
           <a:off x="625035" y="592443"/>
-          <a:ext cx="10996990" cy="6268907"/>
+          <a:ext cx="10996990" cy="6227223"/>
         </p:xfrm>
         <a:graphic>
           <a:graphicData uri="http://schemas.openxmlformats.org/drawingml/2006/table">
@@ -18761,10 +18761,17 @@
                         <a:t>improvement of about 35% above the Hard Coded system. </a:t>
                       </a:r>
                     </a:p>
+                  </a:txBody>
+                  <a:tcPr marL="91425" marR="91425" marT="91425" marB="91425"/>
+                </a:tc>
+                <a:tc>
+                  <a:txBody>
+                    <a:bodyPr/>
+                    <a:lstStyle/>
                     <a:p>
-                      <a:pPr marL="0" marR="0" lvl="0" indent="0" algn="ctr" rtl="0">
+                      <a:pPr marL="0" marR="0" lvl="0" indent="0" algn="ctr" defTabSz="914400" rtl="0" eaLnBrk="1" fontAlgn="auto" latinLnBrk="0" hangingPunct="1">
                         <a:lnSpc>
-                          <a:spcPct val="90000"/>
+                          <a:spcPct val="100000"/>
                         </a:lnSpc>
                         <a:spcBef>
                           <a:spcPts val="0"/>
@@ -18773,21 +18780,16 @@
                           <a:spcPts val="0"/>
                         </a:spcAft>
                         <a:buClr>
-                          <a:schemeClr val="dk1"/>
+                          <a:srgbClr val="000000"/>
                         </a:buClr>
-                        <a:buSzPts val="2400"/>
+                        <a:buSzPts val="2000"/>
                         <a:buFont typeface="Arial"/>
                         <a:buNone/>
+                        <a:tabLst/>
+                        <a:defRPr/>
                       </a:pPr>
-                      <a:endParaRPr sz="2000" u="none" strike="noStrike" cap="none" dirty="0"/>
+                      <a:endParaRPr lang="en-IN" sz="2000" dirty="0"/>
                     </a:p>
-                  </a:txBody>
-                  <a:tcPr marL="91425" marR="91425" marT="91425" marB="91425"/>
-                </a:tc>
-                <a:tc>
-                  <a:txBody>
-                    <a:bodyPr/>
-                    <a:lstStyle/>
                     <a:p>
                       <a:pPr marL="0" marR="0" lvl="0" indent="0" algn="ctr" defTabSz="914400" rtl="0" eaLnBrk="1" fontAlgn="auto" latinLnBrk="0" hangingPunct="1">
                         <a:lnSpc>
@@ -19245,9 +19247,29 @@
                         <a:buFont typeface="Arial"/>
                         <a:buNone/>
                       </a:pPr>
+                      <a:endParaRPr lang="en-IN" sz="2000" dirty="0"/>
+                    </a:p>
+                    <a:p>
+                      <a:pPr marL="0" marR="0" lvl="0" indent="0" algn="ctr" rtl="0">
+                        <a:lnSpc>
+                          <a:spcPct val="100000"/>
+                        </a:lnSpc>
+                        <a:spcBef>
+                          <a:spcPts val="0"/>
+                        </a:spcBef>
+                        <a:spcAft>
+                          <a:spcPts val="0"/>
+                        </a:spcAft>
+                        <a:buClr>
+                          <a:srgbClr val="000000"/>
+                        </a:buClr>
+                        <a:buSzPts val="2000"/>
+                        <a:buFont typeface="Arial"/>
+                        <a:buNone/>
+                      </a:pPr>
                       <a:r>
                         <a:rPr lang="en-IN" sz="2000" dirty="0"/>
-                        <a:t>Ineffective during night hours</a:t>
+                        <a:t>Struggles in low light</a:t>
                       </a:r>
                       <a:endParaRPr sz="2000" dirty="0"/>
                     </a:p>
@@ -19823,7 +19845,7 @@
               <a:buNone/>
             </a:pPr>
             <a:r>
-              <a:rPr lang="en-US">
+              <a:rPr lang="en-US" dirty="0">
                 <a:latin typeface="Times New Roman"/>
                 <a:ea typeface="Times New Roman"/>
                 <a:cs typeface="Times New Roman"/>
@@ -19831,7 +19853,7 @@
               </a:rPr>
               <a:t>Summary</a:t>
             </a:r>
-            <a:endParaRPr>
+            <a:endParaRPr dirty="0">
               <a:latin typeface="Times New Roman"/>
               <a:ea typeface="Times New Roman"/>
               <a:cs typeface="Times New Roman"/>
@@ -19907,7 +19929,7 @@
                 <a:cs typeface="Times New Roman"/>
                 <a:sym typeface="Times New Roman"/>
               </a:rPr>
-              <a:t> et.al (2014) as it is implemented on a junction and has no relation to every automobile that crosses it apart from its vehicle density and as the only hardware employed in our project would be the surveillance cameras at the junctions therefore no need of constant maintenance and less prone to failure as is the case with Salama  et.al (2010) and Zhao et.al (2009).</a:t>
+              <a:t> et.al (2014) as it is implemented on a junction and has no relation to every automobile that crosses it apart from its vehicle density and as the only hardware employed in our project would be the surveillance cameras at the junctions therefore no need of constant maintenance and less prone to failure as is the case with Badura et.al (2010) and Zhao et.al (2009).</a:t>
             </a:r>
             <a:endParaRPr dirty="0"/>
           </a:p>
@@ -20051,7 +20073,7 @@
   <p:cSld>
     <p:spTree>
       <p:nvGrpSpPr>
-        <p:cNvPr id="1" name=""/>
+        <p:cNvPr id="1" name="Shape 89"/>
         <p:cNvGrpSpPr/>
         <p:nvPr/>
       </p:nvGrpSpPr>
@@ -20065,51 +20087,72 @@
       </p:grpSpPr>
       <p:sp>
         <p:nvSpPr>
-          <p:cNvPr id="2" name="Title 1">
-            <a:extLst>
-              <a:ext uri="{FF2B5EF4-FFF2-40B4-BE49-F238E27FC236}">
-                <a16:creationId xmlns:a16="http://schemas.microsoft.com/office/drawing/2014/main" id="{21318379-E22B-4101-ADF7-FF1771FB3C80}"/>
-              </a:ext>
-            </a:extLst>
-          </p:cNvPr>
-          <p:cNvSpPr>
+          <p:cNvPr id="90" name="Google Shape;90;p2"/>
+          <p:cNvSpPr txBox="1">
             <a:spLocks noGrp="1"/>
           </p:cNvSpPr>
           <p:nvPr>
             <p:ph type="title"/>
           </p:nvPr>
         </p:nvSpPr>
-        <p:spPr/>
+        <p:spPr>
+          <a:xfrm>
+            <a:off x="838200" y="365125"/>
+            <a:ext cx="10515600" cy="1325563"/>
+          </a:xfrm>
+          <a:prstGeom prst="rect">
+            <a:avLst/>
+          </a:prstGeom>
+          <a:noFill/>
+          <a:ln>
+            <a:noFill/>
+          </a:ln>
+        </p:spPr>
         <p:txBody>
-          <a:bodyPr>
+          <a:bodyPr spcFirstLastPara="1" wrap="square" lIns="91425" tIns="45700" rIns="91425" bIns="45700" anchor="ctr" anchorCtr="0">
             <a:normAutofit/>
           </a:bodyPr>
           <a:lstStyle/>
           <a:p>
+            <a:pPr marL="0" lvl="0" indent="0" algn="l" rtl="0">
+              <a:lnSpc>
+                <a:spcPct val="90000"/>
+              </a:lnSpc>
+              <a:spcBef>
+                <a:spcPts val="0"/>
+              </a:spcBef>
+              <a:spcAft>
+                <a:spcPts val="0"/>
+              </a:spcAft>
+              <a:buClr>
+                <a:schemeClr val="dk1"/>
+              </a:buClr>
+              <a:buSzPts val="4000"/>
+              <a:buFont typeface="Times New Roman"/>
+              <a:buNone/>
+            </a:pPr>
             <a:r>
-              <a:rPr lang="en-US" sz="4000" dirty="0">
-                <a:latin typeface="Times New Roman" panose="02020603050405020304" pitchFamily="18" charset="0"/>
-                <a:cs typeface="Times New Roman" panose="02020603050405020304" pitchFamily="18" charset="0"/>
+              <a:rPr lang="en-US" sz="4000" b="1" dirty="0">
+                <a:latin typeface="Times New Roman"/>
+                <a:ea typeface="Times New Roman"/>
+                <a:cs typeface="Times New Roman"/>
+                <a:sym typeface="Times New Roman"/>
               </a:rPr>
-              <a:t>Problem Statement</a:t>
+              <a:t>Introduction</a:t>
             </a:r>
-            <a:endParaRPr lang="en-IN" sz="4000" dirty="0">
-              <a:latin typeface="Times New Roman" panose="02020603050405020304" pitchFamily="18" charset="0"/>
-              <a:cs typeface="Times New Roman" panose="02020603050405020304" pitchFamily="18" charset="0"/>
+            <a:endParaRPr sz="4000" dirty="0">
+              <a:latin typeface="Times New Roman"/>
+              <a:ea typeface="Times New Roman"/>
+              <a:cs typeface="Times New Roman"/>
+              <a:sym typeface="Times New Roman"/>
             </a:endParaRPr>
           </a:p>
         </p:txBody>
       </p:sp>
       <p:sp>
         <p:nvSpPr>
-          <p:cNvPr id="3" name="Text Placeholder 2">
-            <a:extLst>
-              <a:ext uri="{FF2B5EF4-FFF2-40B4-BE49-F238E27FC236}">
-                <a16:creationId xmlns:a16="http://schemas.microsoft.com/office/drawing/2014/main" id="{BA6E131C-4033-4E3F-B3A8-F51680DE056D}"/>
-              </a:ext>
-            </a:extLst>
-          </p:cNvPr>
-          <p:cNvSpPr>
+          <p:cNvPr id="91" name="Google Shape;91;p2"/>
+          <p:cNvSpPr txBox="1">
             <a:spLocks noGrp="1"/>
           </p:cNvSpPr>
           <p:nvPr>
@@ -20119,38 +20162,95 @@
         <p:spPr>
           <a:xfrm>
             <a:off x="838200" y="1825625"/>
-            <a:ext cx="10756392" cy="4351338"/>
+            <a:ext cx="10515600" cy="4351338"/>
           </a:xfrm>
+          <a:prstGeom prst="rect">
+            <a:avLst/>
+          </a:prstGeom>
+          <a:noFill/>
+          <a:ln>
+            <a:noFill/>
+          </a:ln>
         </p:spPr>
         <p:txBody>
-          <a:bodyPr/>
+          <a:bodyPr spcFirstLastPara="1" wrap="square" lIns="91425" tIns="45700" rIns="91425" bIns="45700" anchor="t" anchorCtr="0">
+            <a:normAutofit/>
+          </a:bodyPr>
           <a:lstStyle/>
           <a:p>
-            <a:pPr marL="0" lvl="0" indent="0">
-              <a:spcBef>
-                <a:spcPts val="0"/>
-              </a:spcBef>
+            <a:pPr marL="0" lvl="0" indent="0" algn="l" rtl="0">
+              <a:lnSpc>
+                <a:spcPct val="90000"/>
+              </a:lnSpc>
+              <a:spcBef>
+                <a:spcPts val="0"/>
+              </a:spcBef>
+              <a:spcAft>
+                <a:spcPts val="0"/>
+              </a:spcAft>
+              <a:buClr>
+                <a:schemeClr val="dk1"/>
+              </a:buClr>
               <a:buSzPts val="2600"/>
               <a:buNone/>
             </a:pPr>
             <a:r>
-              <a:rPr lang="en-US" dirty="0">
+              <a:rPr lang="en-US" sz="2600" dirty="0">
                 <a:latin typeface="Times New Roman"/>
                 <a:ea typeface="Times New Roman"/>
                 <a:cs typeface="Times New Roman"/>
                 <a:sym typeface="Times New Roman"/>
               </a:rPr>
-              <a:t>There is very little solutions implemented with machine learning which analysis data from the complete transport grid for achieving overall traffic reduction, this technology exploits the real-time traffic monitoring services which are available nowadays.</a:t>
+              <a:t>Traffic congestion has been one of the major issues that most metropolises are facing in spite of measures being taken to mitigate and reduce it. </a:t>
             </a:r>
+          </a:p>
+          <a:p>
+            <a:pPr marL="0" lvl="0" indent="0" algn="l" rtl="0">
+              <a:lnSpc>
+                <a:spcPct val="90000"/>
+              </a:lnSpc>
+              <a:spcBef>
+                <a:spcPts val="0"/>
+              </a:spcBef>
+              <a:spcAft>
+                <a:spcPts val="0"/>
+              </a:spcAft>
+              <a:buClr>
+                <a:schemeClr val="dk1"/>
+              </a:buClr>
+              <a:buSzPts val="2600"/>
+              <a:buNone/>
+            </a:pPr>
+            <a:endParaRPr lang="en-US" sz="2600" dirty="0">
+              <a:latin typeface="Times New Roman"/>
+              <a:ea typeface="Times New Roman"/>
+              <a:cs typeface="Times New Roman"/>
+              <a:sym typeface="Times New Roman"/>
+            </a:endParaRPr>
+          </a:p>
+          <a:p>
+            <a:pPr marL="0" lvl="0" indent="0">
+              <a:spcBef>
+                <a:spcPts val="0"/>
+              </a:spcBef>
+              <a:buSzPts val="2600"/>
+              <a:buNone/>
+            </a:pPr>
+            <a:r>
+              <a:rPr lang="en-US" sz="2600" dirty="0">
+                <a:latin typeface="Times New Roman" panose="02020603050405020304" pitchFamily="18" charset="0"/>
+                <a:cs typeface="Times New Roman" panose="02020603050405020304" pitchFamily="18" charset="0"/>
+              </a:rPr>
+              <a:t>It will also provide significant data which will help in future road planning and analysis. In further stages multiple traffic lights can be synchronized with each other with an aim of even less traffic congestion and free flow of traffic.</a:t>
+            </a:r>
+            <a:endParaRPr sz="2600" dirty="0">
+              <a:latin typeface="Times New Roman" panose="02020603050405020304" pitchFamily="18" charset="0"/>
+              <a:cs typeface="Times New Roman" panose="02020603050405020304" pitchFamily="18" charset="0"/>
+            </a:endParaRPr>
           </a:p>
         </p:txBody>
       </p:sp>
     </p:spTree>
-    <p:extLst>
-      <p:ext uri="{BB962C8B-B14F-4D97-AF65-F5344CB8AC3E}">
-        <p14:creationId xmlns:p14="http://schemas.microsoft.com/office/powerpoint/2010/main" val="2506059371"/>
-      </p:ext>
-    </p:extLst>
   </p:cSld>
   <p:clrMapOvr>
     <a:masterClrMapping/>
@@ -20420,7 +20520,7 @@
   <p:cSld>
     <p:spTree>
       <p:nvGrpSpPr>
-        <p:cNvPr id="1" name="Shape 89"/>
+        <p:cNvPr id="1" name=""/>
         <p:cNvGrpSpPr/>
         <p:nvPr/>
       </p:nvGrpSpPr>
@@ -20434,72 +20534,51 @@
       </p:grpSpPr>
       <p:sp>
         <p:nvSpPr>
-          <p:cNvPr id="90" name="Google Shape;90;p2"/>
-          <p:cNvSpPr txBox="1">
+          <p:cNvPr id="2" name="Title 1">
+            <a:extLst>
+              <a:ext uri="{FF2B5EF4-FFF2-40B4-BE49-F238E27FC236}">
+                <a16:creationId xmlns:a16="http://schemas.microsoft.com/office/drawing/2014/main" id="{21318379-E22B-4101-ADF7-FF1771FB3C80}"/>
+              </a:ext>
+            </a:extLst>
+          </p:cNvPr>
+          <p:cNvSpPr>
             <a:spLocks noGrp="1"/>
           </p:cNvSpPr>
           <p:nvPr>
             <p:ph type="title"/>
           </p:nvPr>
         </p:nvSpPr>
-        <p:spPr>
-          <a:xfrm>
-            <a:off x="838200" y="365125"/>
-            <a:ext cx="10515600" cy="1325563"/>
-          </a:xfrm>
-          <a:prstGeom prst="rect">
-            <a:avLst/>
-          </a:prstGeom>
-          <a:noFill/>
-          <a:ln>
-            <a:noFill/>
-          </a:ln>
-        </p:spPr>
+        <p:spPr/>
         <p:txBody>
-          <a:bodyPr spcFirstLastPara="1" wrap="square" lIns="91425" tIns="45700" rIns="91425" bIns="45700" anchor="ctr" anchorCtr="0">
+          <a:bodyPr>
             <a:normAutofit/>
           </a:bodyPr>
           <a:lstStyle/>
           <a:p>
-            <a:pPr marL="0" lvl="0" indent="0" algn="l" rtl="0">
-              <a:lnSpc>
-                <a:spcPct val="90000"/>
-              </a:lnSpc>
-              <a:spcBef>
-                <a:spcPts val="0"/>
-              </a:spcBef>
-              <a:spcAft>
-                <a:spcPts val="0"/>
-              </a:spcAft>
-              <a:buClr>
-                <a:schemeClr val="dk1"/>
-              </a:buClr>
-              <a:buSzPts val="4000"/>
-              <a:buFont typeface="Times New Roman"/>
-              <a:buNone/>
-            </a:pPr>
             <a:r>
-              <a:rPr lang="en-US" sz="4000" b="1" dirty="0">
-                <a:latin typeface="Times New Roman"/>
-                <a:ea typeface="Times New Roman"/>
-                <a:cs typeface="Times New Roman"/>
-                <a:sym typeface="Times New Roman"/>
+              <a:rPr lang="en-US" sz="4000" dirty="0">
+                <a:latin typeface="Times New Roman" panose="02020603050405020304" pitchFamily="18" charset="0"/>
+                <a:cs typeface="Times New Roman" panose="02020603050405020304" pitchFamily="18" charset="0"/>
               </a:rPr>
-              <a:t>Introduction</a:t>
+              <a:t>Problem Statement</a:t>
             </a:r>
-            <a:endParaRPr sz="4000" dirty="0">
-              <a:latin typeface="Times New Roman"/>
-              <a:ea typeface="Times New Roman"/>
-              <a:cs typeface="Times New Roman"/>
-              <a:sym typeface="Times New Roman"/>
+            <a:endParaRPr lang="en-IN" sz="4000" dirty="0">
+              <a:latin typeface="Times New Roman" panose="02020603050405020304" pitchFamily="18" charset="0"/>
+              <a:cs typeface="Times New Roman" panose="02020603050405020304" pitchFamily="18" charset="0"/>
             </a:endParaRPr>
           </a:p>
         </p:txBody>
       </p:sp>
       <p:sp>
         <p:nvSpPr>
-          <p:cNvPr id="91" name="Google Shape;91;p2"/>
-          <p:cNvSpPr txBox="1">
+          <p:cNvPr id="3" name="Text Placeholder 2">
+            <a:extLst>
+              <a:ext uri="{FF2B5EF4-FFF2-40B4-BE49-F238E27FC236}">
+                <a16:creationId xmlns:a16="http://schemas.microsoft.com/office/drawing/2014/main" id="{BA6E131C-4033-4E3F-B3A8-F51680DE056D}"/>
+              </a:ext>
+            </a:extLst>
+          </p:cNvPr>
+          <p:cNvSpPr>
             <a:spLocks noGrp="1"/>
           </p:cNvSpPr>
           <p:nvPr>
@@ -20509,95 +20588,38 @@
         <p:spPr>
           <a:xfrm>
             <a:off x="838200" y="1825625"/>
-            <a:ext cx="10515600" cy="4351338"/>
+            <a:ext cx="10756392" cy="4351338"/>
           </a:xfrm>
-          <a:prstGeom prst="rect">
-            <a:avLst/>
-          </a:prstGeom>
-          <a:noFill/>
-          <a:ln>
-            <a:noFill/>
-          </a:ln>
         </p:spPr>
         <p:txBody>
-          <a:bodyPr spcFirstLastPara="1" wrap="square" lIns="91425" tIns="45700" rIns="91425" bIns="45700" anchor="t" anchorCtr="0">
-            <a:normAutofit/>
-          </a:bodyPr>
+          <a:bodyPr/>
           <a:lstStyle/>
           <a:p>
-            <a:pPr marL="0" lvl="0" indent="0" algn="l" rtl="0">
-              <a:lnSpc>
-                <a:spcPct val="90000"/>
-              </a:lnSpc>
-              <a:spcBef>
-                <a:spcPts val="0"/>
-              </a:spcBef>
-              <a:spcAft>
-                <a:spcPts val="0"/>
-              </a:spcAft>
-              <a:buClr>
-                <a:schemeClr val="dk1"/>
-              </a:buClr>
+            <a:pPr marL="0" lvl="0" indent="0">
+              <a:spcBef>
+                <a:spcPts val="0"/>
+              </a:spcBef>
               <a:buSzPts val="2600"/>
               <a:buNone/>
             </a:pPr>
             <a:r>
-              <a:rPr lang="en-US" sz="2600" dirty="0">
+              <a:rPr lang="en-US" dirty="0">
                 <a:latin typeface="Times New Roman"/>
                 <a:ea typeface="Times New Roman"/>
                 <a:cs typeface="Times New Roman"/>
                 <a:sym typeface="Times New Roman"/>
               </a:rPr>
-              <a:t>Traffic congestion has been one of the major issues that most metropolises are facing in spite of measures being taken to mitigate and reduce it. </a:t>
+              <a:t>There is very little solutions implemented with machine learning which analysis data from the complete transport grid for achieving overall traffic reduction, this technology exploits the real-time traffic monitoring services which are available nowadays.</a:t>
             </a:r>
-          </a:p>
-          <a:p>
-            <a:pPr marL="0" lvl="0" indent="0" algn="l" rtl="0">
-              <a:lnSpc>
-                <a:spcPct val="90000"/>
-              </a:lnSpc>
-              <a:spcBef>
-                <a:spcPts val="0"/>
-              </a:spcBef>
-              <a:spcAft>
-                <a:spcPts val="0"/>
-              </a:spcAft>
-              <a:buClr>
-                <a:schemeClr val="dk1"/>
-              </a:buClr>
-              <a:buSzPts val="2600"/>
-              <a:buNone/>
-            </a:pPr>
-            <a:endParaRPr lang="en-US" sz="2600" dirty="0">
-              <a:latin typeface="Times New Roman"/>
-              <a:ea typeface="Times New Roman"/>
-              <a:cs typeface="Times New Roman"/>
-              <a:sym typeface="Times New Roman"/>
-            </a:endParaRPr>
-          </a:p>
-          <a:p>
-            <a:pPr marL="0" lvl="0" indent="0">
-              <a:spcBef>
-                <a:spcPts val="0"/>
-              </a:spcBef>
-              <a:buSzPts val="2600"/>
-              <a:buNone/>
-            </a:pPr>
-            <a:r>
-              <a:rPr lang="en-US" sz="2600" dirty="0">
-                <a:latin typeface="Times New Roman" panose="02020603050405020304" pitchFamily="18" charset="0"/>
-                <a:cs typeface="Times New Roman" panose="02020603050405020304" pitchFamily="18" charset="0"/>
-              </a:rPr>
-              <a:t>It will also provide significant data which will help in future road planning and analysis. In further stages multiple traffic lights can be synchronized with each other with an aim of even less traffic congestion and free flow of traffic.</a:t>
-            </a:r>
-            <a:endParaRPr sz="2600" dirty="0">
-              <a:latin typeface="Times New Roman" panose="02020603050405020304" pitchFamily="18" charset="0"/>
-              <a:cs typeface="Times New Roman" panose="02020603050405020304" pitchFamily="18" charset="0"/>
-            </a:endParaRPr>
           </a:p>
         </p:txBody>
       </p:sp>
     </p:spTree>
+    <p:extLst>
+      <p:ext uri="{BB962C8B-B14F-4D97-AF65-F5344CB8AC3E}">
+        <p14:creationId xmlns:p14="http://schemas.microsoft.com/office/powerpoint/2010/main" val="2506059371"/>
+      </p:ext>
+    </p:extLst>
   </p:cSld>
   <p:clrMapOvr>
     <a:masterClrMapping/>

</xml_diff>